<commit_message>
Chapters 9 and 14
</commit_message>
<xml_diff>
--- a/cai/redo-2024/Slides/09-02-python4e.05.113016.pptx
+++ b/cai/redo-2024/Slides/09-02-python4e.05.113016.pptx
@@ -10371,7 +10371,7 @@
               <a:buNone/>
             </a:pPr>
             <a:r>
-              <a:rPr lang="en-US" sz="3200" u="none" strike="noStrike" cap="none">
+              <a:rPr lang="en-US" sz="3200" u="none" strike="noStrike" cap="none" dirty="0">
                 <a:solidFill>
                   <a:srgbClr val="FF00FF"/>
                 </a:solidFill>
@@ -10383,7 +10383,7 @@
               <a:t>{</a:t>
             </a:r>
             <a:r>
-              <a:rPr lang="en-US" sz="3200" u="none" strike="noStrike" cap="none">
+              <a:rPr lang="en-US" sz="3200" u="none" strike="noStrike" cap="none" dirty="0">
                 <a:solidFill>
                   <a:srgbClr val="00FFFF"/>
                 </a:solidFill>
@@ -10392,19 +10392,19 @@
                 <a:cs typeface="Arial" charset="0"/>
                 <a:sym typeface="Cabin"/>
               </a:rPr>
-              <a:t>'</a:t>
-            </a:r>
-            <a:r>
-              <a:rPr lang="en-US" sz="3200" u="none" strike="noStrike" cap="none" dirty="0" err="1">
-                <a:solidFill>
-                  <a:srgbClr val="00FFFF"/>
+              <a:t>'csev'</a:t>
+            </a:r>
+            <a:r>
+              <a:rPr lang="en-US" sz="3200" u="none" strike="noStrike" cap="none" dirty="0">
+                <a:solidFill>
+                  <a:srgbClr val="FF00FF"/>
                 </a:solidFill>
                 <a:latin typeface="Arial" charset="0"/>
                 <a:ea typeface="Arial" charset="0"/>
                 <a:cs typeface="Arial" charset="0"/>
                 <a:sym typeface="Cabin"/>
               </a:rPr>
-              <a:t>csev</a:t>
+              <a:t>: 2, </a:t>
             </a:r>
             <a:r>
               <a:rPr lang="en-US" sz="3200" u="none" strike="noStrike" cap="none" dirty="0">
@@ -10419,16 +10419,16 @@
               <a:t>'</a:t>
             </a:r>
             <a:r>
-              <a:rPr lang="en-US" sz="3200" u="none" strike="noStrike" cap="none" dirty="0">
-                <a:solidFill>
-                  <a:srgbClr val="FF00FF"/>
+              <a:rPr lang="en-US" sz="3200" u="none" strike="noStrike" cap="none" dirty="0" err="1">
+                <a:solidFill>
+                  <a:srgbClr val="00FFFF"/>
                 </a:solidFill>
                 <a:latin typeface="Arial" charset="0"/>
                 <a:ea typeface="Arial" charset="0"/>
                 <a:cs typeface="Arial" charset="0"/>
                 <a:sym typeface="Cabin"/>
               </a:rPr>
-              <a:t>: 2, </a:t>
+              <a:t>cwen</a:t>
             </a:r>
             <a:r>
               <a:rPr lang="en-US" sz="3200" u="none" strike="noStrike" cap="none" dirty="0">
@@ -10443,16 +10443,16 @@
               <a:t>'</a:t>
             </a:r>
             <a:r>
-              <a:rPr lang="en-US" sz="3200" u="none" strike="noStrike" cap="none" dirty="0" err="1">
-                <a:solidFill>
-                  <a:srgbClr val="00FFFF"/>
+              <a:rPr lang="en-US" sz="3200" u="none" strike="noStrike" cap="none" dirty="0">
+                <a:solidFill>
+                  <a:srgbClr val="FF00FF"/>
                 </a:solidFill>
                 <a:latin typeface="Arial" charset="0"/>
                 <a:ea typeface="Arial" charset="0"/>
                 <a:cs typeface="Arial" charset="0"/>
                 <a:sym typeface="Cabin"/>
               </a:rPr>
-              <a:t>zqian</a:t>
+              <a:t>: 2 , </a:t>
             </a:r>
             <a:r>
               <a:rPr lang="en-US" sz="3200" u="none" strike="noStrike" cap="none" dirty="0">
@@ -10467,16 +10467,16 @@
               <a:t>'</a:t>
             </a:r>
             <a:r>
-              <a:rPr lang="en-US" sz="3200" u="none" strike="noStrike" cap="none" dirty="0">
-                <a:solidFill>
-                  <a:srgbClr val="FF00FF"/>
+              <a:rPr lang="en-US" sz="3200" u="none" strike="noStrike" cap="none" dirty="0" err="1">
+                <a:solidFill>
+                  <a:srgbClr val="00FFFF"/>
                 </a:solidFill>
                 <a:latin typeface="Arial" charset="0"/>
                 <a:ea typeface="Arial" charset="0"/>
                 <a:cs typeface="Arial" charset="0"/>
                 <a:sym typeface="Cabin"/>
               </a:rPr>
-              <a:t>: 1,</a:t>
+              <a:t>zqian</a:t>
             </a:r>
             <a:r>
               <a:rPr lang="en-US" sz="3200" u="none" strike="noStrike" cap="none" dirty="0">
@@ -10488,43 +10488,19 @@
                 <a:cs typeface="Arial" charset="0"/>
                 <a:sym typeface="Cabin"/>
               </a:rPr>
-              <a:t> '</a:t>
-            </a:r>
-            <a:r>
-              <a:rPr lang="en-US" sz="3200" u="none" strike="noStrike" cap="none" dirty="0" err="1">
-                <a:solidFill>
-                  <a:srgbClr val="00FFFF"/>
+              <a:t>'</a:t>
+            </a:r>
+            <a:r>
+              <a:rPr lang="en-US" sz="3200" u="none" strike="noStrike" cap="none" dirty="0">
+                <a:solidFill>
+                  <a:srgbClr val="FF00FF"/>
                 </a:solidFill>
                 <a:latin typeface="Arial" charset="0"/>
                 <a:ea typeface="Arial" charset="0"/>
                 <a:cs typeface="Arial" charset="0"/>
                 <a:sym typeface="Cabin"/>
               </a:rPr>
-              <a:t>cwen</a:t>
-            </a:r>
-            <a:r>
-              <a:rPr lang="en-US" sz="3200" u="none" strike="noStrike" cap="none" dirty="0">
-                <a:solidFill>
-                  <a:srgbClr val="00FFFF"/>
-                </a:solidFill>
-                <a:latin typeface="Arial" charset="0"/>
-                <a:ea typeface="Arial" charset="0"/>
-                <a:cs typeface="Arial" charset="0"/>
-                <a:sym typeface="Cabin"/>
-              </a:rPr>
-              <a:t>'</a:t>
-            </a:r>
-            <a:r>
-              <a:rPr lang="en-US" sz="3200" u="none" strike="noStrike" cap="none" dirty="0">
-                <a:solidFill>
-                  <a:srgbClr val="FF00FF"/>
-                </a:solidFill>
-                <a:latin typeface="Arial" charset="0"/>
-                <a:ea typeface="Arial" charset="0"/>
-                <a:cs typeface="Arial" charset="0"/>
-                <a:sym typeface="Cabin"/>
-              </a:rPr>
-              <a:t>: 2}</a:t>
+              <a:t>: 1}</a:t>
             </a:r>
           </a:p>
         </p:txBody>
@@ -11471,19 +11447,19 @@
                 <a:cs typeface="Arial" charset="0"/>
                 <a:sym typeface="Cabin"/>
               </a:rPr>
-              <a:t>'</a:t>
-            </a:r>
-            <a:r>
-              <a:rPr lang="en-US" sz="3200" u="none" strike="noStrike" cap="none" dirty="0" err="1">
-                <a:solidFill>
-                  <a:srgbClr val="00FFFF"/>
+              <a:t>'csev'</a:t>
+            </a:r>
+            <a:r>
+              <a:rPr lang="en-US" sz="3200" u="none" strike="noStrike" cap="none" dirty="0">
+                <a:solidFill>
+                  <a:srgbClr val="FF00FF"/>
                 </a:solidFill>
                 <a:latin typeface="Arial" charset="0"/>
                 <a:ea typeface="Arial" charset="0"/>
                 <a:cs typeface="Arial" charset="0"/>
                 <a:sym typeface="Cabin"/>
               </a:rPr>
-              <a:t>csev</a:t>
+              <a:t>: 2, </a:t>
             </a:r>
             <a:r>
               <a:rPr lang="en-US" sz="3200" u="none" strike="noStrike" cap="none" dirty="0">
@@ -11498,16 +11474,16 @@
               <a:t>'</a:t>
             </a:r>
             <a:r>
-              <a:rPr lang="en-US" sz="3200" u="none" strike="noStrike" cap="none" dirty="0">
-                <a:solidFill>
-                  <a:srgbClr val="FF00FF"/>
+              <a:rPr lang="en-US" sz="3200" u="none" strike="noStrike" cap="none" dirty="0" err="1">
+                <a:solidFill>
+                  <a:srgbClr val="00FFFF"/>
                 </a:solidFill>
                 <a:latin typeface="Arial" charset="0"/>
                 <a:ea typeface="Arial" charset="0"/>
                 <a:cs typeface="Arial" charset="0"/>
                 <a:sym typeface="Cabin"/>
               </a:rPr>
-              <a:t>: 2, </a:t>
+              <a:t>cwen</a:t>
             </a:r>
             <a:r>
               <a:rPr lang="en-US" sz="3200" u="none" strike="noStrike" cap="none" dirty="0">
@@ -11522,16 +11498,16 @@
               <a:t>'</a:t>
             </a:r>
             <a:r>
-              <a:rPr lang="en-US" sz="3200" u="none" strike="noStrike" cap="none" dirty="0" err="1">
-                <a:solidFill>
-                  <a:srgbClr val="00FFFF"/>
+              <a:rPr lang="en-US" sz="3200" u="none" strike="noStrike" cap="none" dirty="0">
+                <a:solidFill>
+                  <a:srgbClr val="FF00FF"/>
                 </a:solidFill>
                 <a:latin typeface="Arial" charset="0"/>
                 <a:ea typeface="Arial" charset="0"/>
                 <a:cs typeface="Arial" charset="0"/>
                 <a:sym typeface="Cabin"/>
               </a:rPr>
-              <a:t>zqian</a:t>
+              <a:t>: 2 , </a:t>
             </a:r>
             <a:r>
               <a:rPr lang="en-US" sz="3200" u="none" strike="noStrike" cap="none" dirty="0">
@@ -11546,16 +11522,16 @@
               <a:t>'</a:t>
             </a:r>
             <a:r>
-              <a:rPr lang="en-US" sz="3200" u="none" strike="noStrike" cap="none" dirty="0">
-                <a:solidFill>
-                  <a:srgbClr val="FF00FF"/>
+              <a:rPr lang="en-US" sz="3200" u="none" strike="noStrike" cap="none" dirty="0" err="1">
+                <a:solidFill>
+                  <a:srgbClr val="00FFFF"/>
                 </a:solidFill>
                 <a:latin typeface="Arial" charset="0"/>
                 <a:ea typeface="Arial" charset="0"/>
                 <a:cs typeface="Arial" charset="0"/>
                 <a:sym typeface="Cabin"/>
               </a:rPr>
-              <a:t>: 1,</a:t>
+              <a:t>zqian</a:t>
             </a:r>
             <a:r>
               <a:rPr lang="en-US" sz="3200" u="none" strike="noStrike" cap="none" dirty="0">
@@ -11567,43 +11543,19 @@
                 <a:cs typeface="Arial" charset="0"/>
                 <a:sym typeface="Cabin"/>
               </a:rPr>
-              <a:t> '</a:t>
-            </a:r>
-            <a:r>
-              <a:rPr lang="en-US" sz="3200" u="none" strike="noStrike" cap="none" dirty="0" err="1">
-                <a:solidFill>
-                  <a:srgbClr val="00FFFF"/>
+              <a:t>'</a:t>
+            </a:r>
+            <a:r>
+              <a:rPr lang="en-US" sz="3200" u="none" strike="noStrike" cap="none" dirty="0">
+                <a:solidFill>
+                  <a:srgbClr val="FF00FF"/>
                 </a:solidFill>
                 <a:latin typeface="Arial" charset="0"/>
                 <a:ea typeface="Arial" charset="0"/>
                 <a:cs typeface="Arial" charset="0"/>
                 <a:sym typeface="Cabin"/>
               </a:rPr>
-              <a:t>cwen</a:t>
-            </a:r>
-            <a:r>
-              <a:rPr lang="en-US" sz="3200" u="none" strike="noStrike" cap="none" dirty="0">
-                <a:solidFill>
-                  <a:srgbClr val="00FFFF"/>
-                </a:solidFill>
-                <a:latin typeface="Arial" charset="0"/>
-                <a:ea typeface="Arial" charset="0"/>
-                <a:cs typeface="Arial" charset="0"/>
-                <a:sym typeface="Cabin"/>
-              </a:rPr>
-              <a:t>'</a:t>
-            </a:r>
-            <a:r>
-              <a:rPr lang="en-US" sz="3200" u="none" strike="noStrike" cap="none" dirty="0">
-                <a:solidFill>
-                  <a:srgbClr val="FF00FF"/>
-                </a:solidFill>
-                <a:latin typeface="Arial" charset="0"/>
-                <a:ea typeface="Arial" charset="0"/>
-                <a:cs typeface="Arial" charset="0"/>
-                <a:sym typeface="Cabin"/>
-              </a:rPr>
-              <a:t>: 2}</a:t>
+              <a:t>: 1}</a:t>
             </a:r>
           </a:p>
         </p:txBody>
@@ -12515,7 +12467,7 @@
         </p:nvSpPr>
         <p:spPr>
           <a:xfrm>
-            <a:off x="9004375" y="7096499"/>
+            <a:off x="9004375" y="6749045"/>
             <a:ext cx="7118400" cy="698400"/>
           </a:xfrm>
           <a:prstGeom prst="rect">
@@ -12550,7 +12502,7 @@
               <a:buNone/>
             </a:pPr>
             <a:r>
-              <a:rPr lang="en-US" sz="3200" u="none" strike="noStrike" cap="none">
+              <a:rPr lang="en-US" sz="3200" u="none" strike="noStrike" cap="none" dirty="0">
                 <a:solidFill>
                   <a:srgbClr val="FF00FF"/>
                 </a:solidFill>
@@ -12562,7 +12514,7 @@
               <a:t>{</a:t>
             </a:r>
             <a:r>
-              <a:rPr lang="en-US" sz="3200" u="none" strike="noStrike" cap="none">
+              <a:rPr lang="en-US" sz="3200" u="none" strike="noStrike" cap="none" dirty="0">
                 <a:solidFill>
                   <a:srgbClr val="00FFFF"/>
                 </a:solidFill>
@@ -12574,7 +12526,7 @@
               <a:t>'csev'</a:t>
             </a:r>
             <a:r>
-              <a:rPr lang="en-US" sz="3200" u="none" strike="noStrike" cap="none">
+              <a:rPr lang="en-US" sz="3200" u="none" strike="noStrike" cap="none" dirty="0">
                 <a:solidFill>
                   <a:srgbClr val="FF00FF"/>
                 </a:solidFill>
@@ -12586,7 +12538,7 @@
               <a:t>: 2, </a:t>
             </a:r>
             <a:r>
-              <a:rPr lang="en-US" sz="3200" u="none" strike="noStrike" cap="none">
+              <a:rPr lang="en-US" sz="3200" u="none" strike="noStrike" cap="none" dirty="0">
                 <a:solidFill>
                   <a:srgbClr val="00FFFF"/>
                 </a:solidFill>
@@ -12595,22 +12547,22 @@
                 <a:cs typeface="Arial" charset="0"/>
                 <a:sym typeface="Cabin"/>
               </a:rPr>
-              <a:t>'zqian'</a:t>
-            </a:r>
-            <a:r>
-              <a:rPr lang="en-US" sz="3200" u="none" strike="noStrike" cap="none">
-                <a:solidFill>
-                  <a:srgbClr val="FF00FF"/>
+              <a:t>'</a:t>
+            </a:r>
+            <a:r>
+              <a:rPr lang="en-US" sz="3200" u="none" strike="noStrike" cap="none" dirty="0" err="1">
+                <a:solidFill>
+                  <a:srgbClr val="00FFFF"/>
                 </a:solidFill>
                 <a:latin typeface="Arial" charset="0"/>
                 <a:ea typeface="Arial" charset="0"/>
                 <a:cs typeface="Arial" charset="0"/>
                 <a:sym typeface="Cabin"/>
               </a:rPr>
-              <a:t>: 1,</a:t>
-            </a:r>
-            <a:r>
-              <a:rPr lang="en-US" sz="3200" u="none" strike="noStrike" cap="none">
+              <a:t>cwen</a:t>
+            </a:r>
+            <a:r>
+              <a:rPr lang="en-US" sz="3200" u="none" strike="noStrike" cap="none" dirty="0">
                 <a:solidFill>
                   <a:srgbClr val="00FFFF"/>
                 </a:solidFill>
@@ -12619,10 +12571,10 @@
                 <a:cs typeface="Arial" charset="0"/>
                 <a:sym typeface="Cabin"/>
               </a:rPr>
-              <a:t> 'cwen'</a:t>
-            </a:r>
-            <a:r>
-              <a:rPr lang="en-US" sz="3200" u="none" strike="noStrike" cap="none">
+              <a:t>'</a:t>
+            </a:r>
+            <a:r>
+              <a:rPr lang="en-US" sz="3200" u="none" strike="noStrike" cap="none" dirty="0">
                 <a:solidFill>
                   <a:srgbClr val="FF00FF"/>
                 </a:solidFill>
@@ -12631,7 +12583,55 @@
                 <a:cs typeface="Arial" charset="0"/>
                 <a:sym typeface="Cabin"/>
               </a:rPr>
-              <a:t>: 2}</a:t>
+              <a:t>: 2 , </a:t>
+            </a:r>
+            <a:r>
+              <a:rPr lang="en-US" sz="3200" u="none" strike="noStrike" cap="none" dirty="0">
+                <a:solidFill>
+                  <a:srgbClr val="00FFFF"/>
+                </a:solidFill>
+                <a:latin typeface="Arial" charset="0"/>
+                <a:ea typeface="Arial" charset="0"/>
+                <a:cs typeface="Arial" charset="0"/>
+                <a:sym typeface="Cabin"/>
+              </a:rPr>
+              <a:t>'</a:t>
+            </a:r>
+            <a:r>
+              <a:rPr lang="en-US" sz="3200" u="none" strike="noStrike" cap="none" dirty="0" err="1">
+                <a:solidFill>
+                  <a:srgbClr val="00FFFF"/>
+                </a:solidFill>
+                <a:latin typeface="Arial" charset="0"/>
+                <a:ea typeface="Arial" charset="0"/>
+                <a:cs typeface="Arial" charset="0"/>
+                <a:sym typeface="Cabin"/>
+              </a:rPr>
+              <a:t>zqian</a:t>
+            </a:r>
+            <a:r>
+              <a:rPr lang="en-US" sz="3200" u="none" strike="noStrike" cap="none" dirty="0">
+                <a:solidFill>
+                  <a:srgbClr val="00FFFF"/>
+                </a:solidFill>
+                <a:latin typeface="Arial" charset="0"/>
+                <a:ea typeface="Arial" charset="0"/>
+                <a:cs typeface="Arial" charset="0"/>
+                <a:sym typeface="Cabin"/>
+              </a:rPr>
+              <a:t>'</a:t>
+            </a:r>
+            <a:r>
+              <a:rPr lang="en-US" sz="3200" u="none" strike="noStrike" cap="none" dirty="0">
+                <a:solidFill>
+                  <a:srgbClr val="FF00FF"/>
+                </a:solidFill>
+                <a:latin typeface="Arial" charset="0"/>
+                <a:ea typeface="Arial" charset="0"/>
+                <a:cs typeface="Arial" charset="0"/>
+                <a:sym typeface="Cabin"/>
+              </a:rPr>
+              <a:t>: 1}</a:t>
             </a:r>
           </a:p>
         </p:txBody>
@@ -12690,64 +12690,6 @@
       </p:pic>
       <p:sp>
         <p:nvSpPr>
-          <p:cNvPr id="414" name="Shape 414"/>
-          <p:cNvSpPr txBox="1"/>
-          <p:nvPr/>
-        </p:nvSpPr>
-        <p:spPr>
-          <a:xfrm>
-            <a:off x="2848750" y="6534829"/>
-            <a:ext cx="10558500" cy="622199"/>
-          </a:xfrm>
-          <a:prstGeom prst="rect">
-            <a:avLst/>
-          </a:prstGeom>
-          <a:noFill/>
-          <a:ln>
-            <a:noFill/>
-          </a:ln>
-        </p:spPr>
-        <p:txBody>
-          <a:bodyPr lIns="0" tIns="0" rIns="0" bIns="0" anchor="ctr" anchorCtr="0">
-            <a:noAutofit/>
-          </a:bodyPr>
-          <a:lstStyle/>
-          <a:p>
-            <a:pPr marL="0" marR="0" lvl="0" indent="0" algn="ctr" rtl="0">
-              <a:lnSpc>
-                <a:spcPct val="100000"/>
-              </a:lnSpc>
-              <a:spcBef>
-                <a:spcPts val="0"/>
-              </a:spcBef>
-              <a:spcAft>
-                <a:spcPts val="0"/>
-              </a:spcAft>
-              <a:buClr>
-                <a:srgbClr val="FFFF00"/>
-              </a:buClr>
-              <a:buSzPct val="25000"/>
-              <a:buFont typeface="Cabin"/>
-              <a:buNone/>
-            </a:pPr>
-            <a:r>
-              <a:rPr lang="en-US" sz="3000" u="sng" strike="noStrike" cap="none" dirty="0">
-                <a:solidFill>
-                  <a:srgbClr val="FFFF00"/>
-                </a:solidFill>
-                <a:latin typeface="Arial" charset="0"/>
-                <a:ea typeface="Arial" charset="0"/>
-                <a:cs typeface="Arial" charset="0"/>
-                <a:sym typeface="Cabin"/>
-                <a:hlinkClick r:id="rId4"/>
-              </a:rPr>
-              <a:t>http://www.youtube.com/watch?v=EHJ9uYx5L58</a:t>
-            </a:r>
-          </a:p>
-        </p:txBody>
-      </p:sp>
-      <p:sp>
-        <p:nvSpPr>
           <p:cNvPr id="415" name="Shape 415"/>
           <p:cNvSpPr txBox="1"/>
           <p:nvPr/>
@@ -13404,6 +13346,55 @@
                 <a:sym typeface="Cabin"/>
               </a:rPr>
               <a:t>()</a:t>
+            </a:r>
+          </a:p>
+        </p:txBody>
+      </p:sp>
+      <p:sp>
+        <p:nvSpPr>
+          <p:cNvPr id="2" name="TextBox 1">
+            <a:extLst>
+              <a:ext uri="{FF2B5EF4-FFF2-40B4-BE49-F238E27FC236}">
+                <a16:creationId xmlns:a16="http://schemas.microsoft.com/office/drawing/2014/main" id="{EDD127E5-0DE1-C346-1DA4-6BA0EECFA2B7}"/>
+              </a:ext>
+            </a:extLst>
+          </p:cNvPr>
+          <p:cNvSpPr txBox="1"/>
+          <p:nvPr/>
+        </p:nvSpPr>
+        <p:spPr>
+          <a:xfrm>
+            <a:off x="4400550" y="6126772"/>
+            <a:ext cx="6043642" cy="954107"/>
+          </a:xfrm>
+          <a:prstGeom prst="rect">
+            <a:avLst/>
+          </a:prstGeom>
+          <a:noFill/>
+        </p:spPr>
+        <p:txBody>
+          <a:bodyPr wrap="none" rtlCol="0">
+            <a:spAutoFit/>
+          </a:bodyPr>
+          <a:lstStyle/>
+          <a:p>
+            <a:r>
+              <a:rPr lang="en-US" sz="2800" dirty="0">
+                <a:solidFill>
+                  <a:schemeClr val="bg1"/>
+                </a:solidFill>
+              </a:rPr>
+              <a:t>Counting is Marvelous </a:t>
+            </a:r>
+          </a:p>
+          <a:p>
+            <a:r>
+              <a:rPr lang="en-US" sz="2800" dirty="0">
+                <a:solidFill>
+                  <a:schemeClr val="bg1"/>
+                </a:solidFill>
+              </a:rPr>
+              <a:t>	– the Count on Sesame Street </a:t>
             </a:r>
           </a:p>
         </p:txBody>

</xml_diff>